<commit_message>
Edit and complete item_proparties pipeline
</commit_message>
<xml_diff>
--- a/Presentation1.pptx
+++ b/Presentation1.pptx
@@ -245,7 +245,7 @@
           <a:p>
             <a:fld id="{18B5F1E0-5D9A-461D-B9FA-2358B0F765B5}" type="datetimeFigureOut">
               <a:rPr lang="en-US" smtClean="0"/>
-              <a:t>6/11/2022</a:t>
+              <a:t>6/12/2022</a:t>
             </a:fld>
             <a:endParaRPr lang="en-US"/>
           </a:p>
@@ -415,7 +415,7 @@
           <a:p>
             <a:fld id="{18B5F1E0-5D9A-461D-B9FA-2358B0F765B5}" type="datetimeFigureOut">
               <a:rPr lang="en-US" smtClean="0"/>
-              <a:t>6/11/2022</a:t>
+              <a:t>6/12/2022</a:t>
             </a:fld>
             <a:endParaRPr lang="en-US"/>
           </a:p>
@@ -595,7 +595,7 @@
           <a:p>
             <a:fld id="{18B5F1E0-5D9A-461D-B9FA-2358B0F765B5}" type="datetimeFigureOut">
               <a:rPr lang="en-US" smtClean="0"/>
-              <a:t>6/11/2022</a:t>
+              <a:t>6/12/2022</a:t>
             </a:fld>
             <a:endParaRPr lang="en-US"/>
           </a:p>
@@ -765,7 +765,7 @@
           <a:p>
             <a:fld id="{18B5F1E0-5D9A-461D-B9FA-2358B0F765B5}" type="datetimeFigureOut">
               <a:rPr lang="en-US" smtClean="0"/>
-              <a:t>6/11/2022</a:t>
+              <a:t>6/12/2022</a:t>
             </a:fld>
             <a:endParaRPr lang="en-US"/>
           </a:p>
@@ -1011,7 +1011,7 @@
           <a:p>
             <a:fld id="{18B5F1E0-5D9A-461D-B9FA-2358B0F765B5}" type="datetimeFigureOut">
               <a:rPr lang="en-US" smtClean="0"/>
-              <a:t>6/11/2022</a:t>
+              <a:t>6/12/2022</a:t>
             </a:fld>
             <a:endParaRPr lang="en-US"/>
           </a:p>
@@ -1243,7 +1243,7 @@
           <a:p>
             <a:fld id="{18B5F1E0-5D9A-461D-B9FA-2358B0F765B5}" type="datetimeFigureOut">
               <a:rPr lang="en-US" smtClean="0"/>
-              <a:t>6/11/2022</a:t>
+              <a:t>6/12/2022</a:t>
             </a:fld>
             <a:endParaRPr lang="en-US"/>
           </a:p>
@@ -1610,7 +1610,7 @@
           <a:p>
             <a:fld id="{18B5F1E0-5D9A-461D-B9FA-2358B0F765B5}" type="datetimeFigureOut">
               <a:rPr lang="en-US" smtClean="0"/>
-              <a:t>6/11/2022</a:t>
+              <a:t>6/12/2022</a:t>
             </a:fld>
             <a:endParaRPr lang="en-US"/>
           </a:p>
@@ -1728,7 +1728,7 @@
           <a:p>
             <a:fld id="{18B5F1E0-5D9A-461D-B9FA-2358B0F765B5}" type="datetimeFigureOut">
               <a:rPr lang="en-US" smtClean="0"/>
-              <a:t>6/11/2022</a:t>
+              <a:t>6/12/2022</a:t>
             </a:fld>
             <a:endParaRPr lang="en-US"/>
           </a:p>
@@ -1823,7 +1823,7 @@
           <a:p>
             <a:fld id="{18B5F1E0-5D9A-461D-B9FA-2358B0F765B5}" type="datetimeFigureOut">
               <a:rPr lang="en-US" smtClean="0"/>
-              <a:t>6/11/2022</a:t>
+              <a:t>6/12/2022</a:t>
             </a:fld>
             <a:endParaRPr lang="en-US"/>
           </a:p>
@@ -2100,7 +2100,7 @@
           <a:p>
             <a:fld id="{18B5F1E0-5D9A-461D-B9FA-2358B0F765B5}" type="datetimeFigureOut">
               <a:rPr lang="en-US" smtClean="0"/>
-              <a:t>6/11/2022</a:t>
+              <a:t>6/12/2022</a:t>
             </a:fld>
             <a:endParaRPr lang="en-US"/>
           </a:p>
@@ -2357,7 +2357,7 @@
           <a:p>
             <a:fld id="{18B5F1E0-5D9A-461D-B9FA-2358B0F765B5}" type="datetimeFigureOut">
               <a:rPr lang="en-US" smtClean="0"/>
-              <a:t>6/11/2022</a:t>
+              <a:t>6/12/2022</a:t>
             </a:fld>
             <a:endParaRPr lang="en-US"/>
           </a:p>
@@ -2570,7 +2570,7 @@
           <a:p>
             <a:fld id="{18B5F1E0-5D9A-461D-B9FA-2358B0F765B5}" type="datetimeFigureOut">
               <a:rPr lang="en-US" smtClean="0"/>
-              <a:t>6/11/2022</a:t>
+              <a:t>6/12/2022</a:t>
             </a:fld>
             <a:endParaRPr lang="en-US"/>
           </a:p>

</xml_diff>